<commit_message>
Final Updates from end-of-semester
</commit_message>
<xml_diff>
--- a/Class 12- Some More Techniques and Examples.pptx
+++ b/Class 12- Some More Techniques and Examples.pptx
@@ -7107,13 +7107,8 @@
             <a:pPr lvl="1"/>
             <a:r>
               <a:rPr lang="en-US" dirty="0"/>
-              <a:t>Let’s walk through the Himanshu Chandra’s </a:t>
-            </a:r>
-            <a:r>
-              <a:rPr lang="en-US" dirty="0" err="1"/>
-              <a:t>Colab</a:t>
-            </a:r>
-            <a:endParaRPr lang="en-US" dirty="0"/>
+              <a:t>Let’s walk through Himanshu Chandra’s Colab</a:t>
+            </a:r>
           </a:p>
           <a:p>
             <a:pPr lvl="1"/>

</xml_diff>